<commit_message>
use case diagram hopefully final
</commit_message>
<xml_diff>
--- a/ThingSpaceTsM2.pptx
+++ b/ThingSpaceTsM2.pptx
@@ -6084,7 +6084,48 @@
           <a:bodyPr/>
           <a:lstStyle/>
           <a:p>
-            <a:endParaRPr lang="pl-PL"/>
+            <a:r>
+              <a:rPr lang="en-IE" b="1" dirty="0"/>
+              <a:t>Actors:</a:t>
+            </a:r>
+            <a:r>
+              <a:rPr lang="en-IE" dirty="0"/>
+              <a:t> We have a User who can perform operation on his own notes as well as share the notes with other users and workspaces they are in. Another actor would be workspace owner who can perform editorial tasks inside a workspace.</a:t>
+            </a:r>
+          </a:p>
+          <a:p>
+            <a:r>
+              <a:rPr lang="en-IE" b="1" dirty="0"/>
+              <a:t>Central Features:</a:t>
+            </a:r>
+            <a:br>
+              <a:rPr lang="en-IE" b="1" dirty="0"/>
+            </a:br>
+            <a:r>
+              <a:rPr lang="en-IE" dirty="0"/>
+              <a:t>- Note Management (CRUD + sharing)</a:t>
+            </a:r>
+            <a:br>
+              <a:rPr lang="en-IE" dirty="0"/>
+            </a:br>
+            <a:r>
+              <a:rPr lang="en-IE" dirty="0"/>
+              <a:t>- Note Retrieval (Filtering + Synonymic Search)</a:t>
+            </a:r>
+            <a:br>
+              <a:rPr lang="en-IE" dirty="0"/>
+            </a:br>
+            <a:r>
+              <a:rPr lang="en-IE" dirty="0"/>
+              <a:t>- Workspace Participation (Joining and Managing)</a:t>
+            </a:r>
+            <a:br>
+              <a:rPr lang="en-IE" dirty="0"/>
+            </a:br>
+            <a:r>
+              <a:rPr lang="en-IE" dirty="0"/>
+              <a:t>- The selling point: Format customization with Templates</a:t>
+            </a:r>
           </a:p>
         </p:txBody>
       </p:sp>
@@ -6229,8 +6270,8 @@
         </p:nvSpPr>
         <p:spPr>
           <a:xfrm>
-            <a:off x="1688771" y="3029782"/>
-            <a:ext cx="2789861" cy="1618656"/>
+            <a:off x="1673255" y="2741026"/>
+            <a:ext cx="2789861" cy="1884095"/>
           </a:xfrm>
           <a:prstGeom prst="rect">
             <a:avLst/>
@@ -6260,7 +6301,7 @@
           <a:lstStyle/>
           <a:p>
             <a:pPr algn="ctr"/>
-            <a:endParaRPr lang="pl-PL"/>
+            <a:endParaRPr lang="pl-PL" dirty="0"/>
           </a:p>
         </p:txBody>
       </p:sp>
@@ -6376,8 +6417,8 @@
         </p:nvSpPr>
         <p:spPr>
           <a:xfrm>
-            <a:off x="2628392" y="1530872"/>
-            <a:ext cx="1669753" cy="1385991"/>
+            <a:off x="2756946" y="1530872"/>
+            <a:ext cx="1541199" cy="1104943"/>
           </a:xfrm>
           <a:prstGeom prst="rect">
             <a:avLst/>
@@ -6490,7 +6531,7 @@
         </p:nvSpPr>
         <p:spPr>
           <a:xfrm>
-            <a:off x="3025213" y="1900204"/>
+            <a:off x="3035921" y="1757287"/>
             <a:ext cx="925253" cy="338554"/>
           </a:xfrm>
           <a:prstGeom prst="rect">
@@ -6526,7 +6567,7 @@
         </p:nvSpPr>
         <p:spPr>
           <a:xfrm>
-            <a:off x="3064293" y="2241155"/>
+            <a:off x="3106652" y="2021289"/>
             <a:ext cx="847091" cy="338554"/>
           </a:xfrm>
           <a:prstGeom prst="rect">
@@ -6562,7 +6603,7 @@
         </p:nvSpPr>
         <p:spPr>
           <a:xfrm>
-            <a:off x="2788412" y="2578309"/>
+            <a:off x="2794732" y="2299799"/>
             <a:ext cx="1482265" cy="338554"/>
           </a:xfrm>
           <a:prstGeom prst="rect">
@@ -6850,7 +6891,7 @@
         </p:nvSpPr>
         <p:spPr>
           <a:xfrm>
-            <a:off x="2133459" y="3029782"/>
+            <a:off x="2141513" y="2743564"/>
             <a:ext cx="1847685" cy="338554"/>
           </a:xfrm>
           <a:prstGeom prst="rect">
@@ -6886,7 +6927,7 @@
         </p:nvSpPr>
         <p:spPr>
           <a:xfrm>
-            <a:off x="2065309" y="3312727"/>
+            <a:off x="2073363" y="3026509"/>
             <a:ext cx="1989647" cy="338554"/>
           </a:xfrm>
           <a:prstGeom prst="rect">
@@ -6922,7 +6963,7 @@
         </p:nvSpPr>
         <p:spPr>
           <a:xfrm>
-            <a:off x="2124097" y="3633867"/>
+            <a:off x="2132151" y="3347649"/>
             <a:ext cx="1866921" cy="338554"/>
           </a:xfrm>
           <a:prstGeom prst="rect">
@@ -6958,7 +6999,7 @@
         </p:nvSpPr>
         <p:spPr>
           <a:xfrm>
-            <a:off x="2227236" y="3940552"/>
+            <a:off x="2235290" y="3654334"/>
             <a:ext cx="1660134" cy="338554"/>
           </a:xfrm>
           <a:prstGeom prst="rect">
@@ -7030,7 +7071,7 @@
         </p:nvSpPr>
         <p:spPr>
           <a:xfrm>
-            <a:off x="2214461" y="4231108"/>
+            <a:off x="2222515" y="3944890"/>
             <a:ext cx="1716239" cy="338554"/>
           </a:xfrm>
           <a:prstGeom prst="rect">
@@ -7066,7 +7107,7 @@
         </p:nvSpPr>
         <p:spPr>
           <a:xfrm>
-            <a:off x="395182" y="2521087"/>
+            <a:off x="348649" y="1357382"/>
             <a:ext cx="643125" cy="369332"/>
           </a:xfrm>
           <a:prstGeom prst="rect">
@@ -7118,17 +7159,38 @@
           <a:p>
             <a:pPr algn="ctr"/>
             <a:r>
-              <a:rPr lang="en-IE" b="1" i="1" dirty="0"/>
+              <a:rPr lang="en-IE" b="1" i="1" dirty="0">
+                <a:solidFill>
+                  <a:schemeClr val="accent5">
+                    <a:lumMod val="60000"/>
+                    <a:lumOff val="40000"/>
+                  </a:schemeClr>
+                </a:solidFill>
+              </a:rPr>
               <a:t>Text2Speech</a:t>
             </a:r>
             <a:br>
               <a:rPr lang="en-IE" b="1" i="1" dirty="0"/>
             </a:br>
             <a:r>
-              <a:rPr lang="en-IE" b="1" i="1" dirty="0"/>
+              <a:rPr lang="en-IE" b="1" i="1" dirty="0">
+                <a:solidFill>
+                  <a:schemeClr val="accent5">
+                    <a:lumMod val="60000"/>
+                    <a:lumOff val="40000"/>
+                  </a:schemeClr>
+                </a:solidFill>
+              </a:rPr>
               <a:t>API</a:t>
             </a:r>
-            <a:endParaRPr lang="pl-PL" b="1" i="1" dirty="0"/>
+            <a:endParaRPr lang="pl-PL" b="1" i="1" dirty="0">
+              <a:solidFill>
+                <a:schemeClr val="accent5">
+                  <a:lumMod val="60000"/>
+                  <a:lumOff val="40000"/>
+                </a:schemeClr>
+              </a:solidFill>
+            </a:endParaRPr>
           </a:p>
         </p:txBody>
       </p:sp>
@@ -7205,10 +7267,24 @@
           <a:lstStyle/>
           <a:p>
             <a:r>
-              <a:rPr lang="en-IE" b="1" i="1" dirty="0"/>
+              <a:rPr lang="en-IE" b="1" i="1" dirty="0">
+                <a:solidFill>
+                  <a:schemeClr val="accent5">
+                    <a:lumMod val="60000"/>
+                    <a:lumOff val="40000"/>
+                  </a:schemeClr>
+                </a:solidFill>
+              </a:rPr>
               <a:t>LLM API</a:t>
             </a:r>
-            <a:endParaRPr lang="pl-PL" b="1" i="1" dirty="0"/>
+            <a:endParaRPr lang="pl-PL" b="1" i="1" dirty="0">
+              <a:solidFill>
+                <a:schemeClr val="accent5">
+                  <a:lumMod val="60000"/>
+                  <a:lumOff val="40000"/>
+                </a:schemeClr>
+              </a:solidFill>
+            </a:endParaRPr>
           </a:p>
         </p:txBody>
       </p:sp>
@@ -7312,8 +7388,8 @@
         </p:nvSpPr>
         <p:spPr>
           <a:xfrm>
-            <a:off x="14664" y="2795009"/>
-            <a:ext cx="1527982" cy="954107"/>
+            <a:off x="-18042" y="1683689"/>
+            <a:ext cx="1481624" cy="1600438"/>
           </a:xfrm>
           <a:prstGeom prst="rect">
             <a:avLst/>
@@ -7336,21 +7412,42 @@
             <a:pPr algn="ctr"/>
             <a:r>
               <a:rPr lang="en-IE" sz="1400" dirty="0"/>
-              <a:t>all use cases.</a:t>
+              <a:t>all use cases</a:t>
             </a:r>
           </a:p>
           <a:p>
             <a:pPr algn="ctr"/>
             <a:r>
               <a:rPr lang="en-IE" sz="1400" dirty="0"/>
-              <a:t>Arrows not shown</a:t>
+              <a:t> other than</a:t>
             </a:r>
           </a:p>
           <a:p>
             <a:pPr algn="ctr"/>
             <a:r>
               <a:rPr lang="en-IE" sz="1400" dirty="0"/>
-              <a:t>For readability</a:t>
+              <a:t> Workspace </a:t>
+            </a:r>
+          </a:p>
+          <a:p>
+            <a:pPr algn="ctr"/>
+            <a:r>
+              <a:rPr lang="en-IE" sz="1400" dirty="0"/>
+              <a:t>Manager. Arrows </a:t>
+            </a:r>
+          </a:p>
+          <a:p>
+            <a:pPr algn="ctr"/>
+            <a:r>
+              <a:rPr lang="en-IE" sz="1400" dirty="0"/>
+              <a:t>not shown for </a:t>
+            </a:r>
+          </a:p>
+          <a:p>
+            <a:pPr algn="ctr"/>
+            <a:r>
+              <a:rPr lang="en-IE" sz="1400" dirty="0"/>
+              <a:t>Readability.</a:t>
             </a:r>
             <a:endParaRPr lang="pl-PL" sz="1400" dirty="0"/>
           </a:p>
@@ -7386,45 +7483,94 @@
           <a:p>
             <a:pPr algn="ctr"/>
             <a:r>
-              <a:rPr lang="en-IE" sz="1400" dirty="0"/>
+              <a:rPr lang="en-IE" sz="1400" dirty="0">
+                <a:solidFill>
+                  <a:schemeClr val="accent5">
+                    <a:lumMod val="60000"/>
+                    <a:lumOff val="40000"/>
+                  </a:schemeClr>
+                </a:solidFill>
+              </a:rPr>
               <a:t>Will be used as an </a:t>
             </a:r>
           </a:p>
           <a:p>
             <a:pPr algn="ctr"/>
             <a:r>
-              <a:rPr lang="en-IE" sz="1400" dirty="0"/>
+              <a:rPr lang="en-IE" sz="1400" dirty="0">
+                <a:solidFill>
+                  <a:schemeClr val="accent5">
+                    <a:lumMod val="60000"/>
+                    <a:lumOff val="40000"/>
+                  </a:schemeClr>
+                </a:solidFill>
+              </a:rPr>
               <a:t>alternative to </a:t>
             </a:r>
           </a:p>
           <a:p>
             <a:pPr algn="ctr"/>
             <a:r>
-              <a:rPr lang="en-IE" sz="1400" dirty="0"/>
+              <a:rPr lang="en-IE" sz="1400" dirty="0">
+                <a:solidFill>
+                  <a:schemeClr val="accent5">
+                    <a:lumMod val="60000"/>
+                    <a:lumOff val="40000"/>
+                  </a:schemeClr>
+                </a:solidFill>
+              </a:rPr>
               <a:t>typing in the </a:t>
             </a:r>
           </a:p>
           <a:p>
             <a:pPr algn="ctr"/>
             <a:r>
-              <a:rPr lang="en-IE" sz="1400" dirty="0"/>
+              <a:rPr lang="en-IE" sz="1400" dirty="0">
+                <a:solidFill>
+                  <a:schemeClr val="accent5">
+                    <a:lumMod val="60000"/>
+                    <a:lumOff val="40000"/>
+                  </a:schemeClr>
+                </a:solidFill>
+              </a:rPr>
               <a:t>text fields. </a:t>
             </a:r>
           </a:p>
           <a:p>
             <a:pPr algn="ctr"/>
             <a:r>
-              <a:rPr lang="en-IE" sz="1400" dirty="0"/>
+              <a:rPr lang="en-IE" sz="1400" dirty="0">
+                <a:solidFill>
+                  <a:schemeClr val="accent5">
+                    <a:lumMod val="60000"/>
+                    <a:lumOff val="40000"/>
+                  </a:schemeClr>
+                </a:solidFill>
+              </a:rPr>
               <a:t>Arrows not shown </a:t>
             </a:r>
           </a:p>
           <a:p>
             <a:pPr algn="ctr"/>
             <a:r>
-              <a:rPr lang="en-IE" sz="1400" dirty="0"/>
+              <a:rPr lang="en-IE" sz="1400" dirty="0">
+                <a:solidFill>
+                  <a:schemeClr val="accent5">
+                    <a:lumMod val="60000"/>
+                    <a:lumOff val="40000"/>
+                  </a:schemeClr>
+                </a:solidFill>
+              </a:rPr>
               <a:t>for readability</a:t>
             </a:r>
-            <a:endParaRPr lang="pl-PL" sz="1400" dirty="0"/>
+            <a:endParaRPr lang="pl-PL" sz="1400" dirty="0">
+              <a:solidFill>
+                <a:schemeClr val="accent5">
+                  <a:lumMod val="60000"/>
+                  <a:lumOff val="40000"/>
+                </a:schemeClr>
+              </a:solidFill>
+            </a:endParaRPr>
           </a:p>
         </p:txBody>
       </p:sp>
@@ -7493,10 +7639,24 @@
           <a:lstStyle/>
           <a:p>
             <a:r>
-              <a:rPr lang="en-IE" sz="1600" dirty="0"/>
+              <a:rPr lang="en-IE" sz="1600" dirty="0">
+                <a:solidFill>
+                  <a:schemeClr val="accent5">
+                    <a:lumMod val="60000"/>
+                    <a:lumOff val="40000"/>
+                  </a:schemeClr>
+                </a:solidFill>
+              </a:rPr>
               <a:t>Autofill</a:t>
             </a:r>
-            <a:endParaRPr lang="pl-PL" sz="1600" dirty="0"/>
+            <a:endParaRPr lang="pl-PL" sz="1600" dirty="0">
+              <a:solidFill>
+                <a:schemeClr val="accent5">
+                  <a:lumMod val="60000"/>
+                  <a:lumOff val="40000"/>
+                </a:schemeClr>
+              </a:solidFill>
+            </a:endParaRPr>
           </a:p>
         </p:txBody>
       </p:sp>
@@ -7545,6 +7705,304 @@
           </a:fontRef>
         </p:style>
       </p:cxnSp>
+      <p:sp>
+        <p:nvSpPr>
+          <p:cNvPr id="32" name="TextBox 31">
+            <a:extLst>
+              <a:ext uri="{FF2B5EF4-FFF2-40B4-BE49-F238E27FC236}">
+                <a16:creationId xmlns:a16="http://schemas.microsoft.com/office/drawing/2014/main" id="{BB4F0DE5-DBD7-7E9F-63FA-4F8AAC2DE93B}"/>
+              </a:ext>
+            </a:extLst>
+          </p:cNvPr>
+          <p:cNvSpPr txBox="1"/>
+          <p:nvPr/>
+        </p:nvSpPr>
+        <p:spPr>
+          <a:xfrm>
+            <a:off x="100404" y="4051237"/>
+            <a:ext cx="1253035" cy="646331"/>
+          </a:xfrm>
+          <a:prstGeom prst="rect">
+            <a:avLst/>
+          </a:prstGeom>
+          <a:noFill/>
+        </p:spPr>
+        <p:txBody>
+          <a:bodyPr wrap="none" rtlCol="0">
+            <a:spAutoFit/>
+          </a:bodyPr>
+          <a:lstStyle/>
+          <a:p>
+            <a:r>
+              <a:rPr lang="en-IE" b="1" i="1" dirty="0"/>
+              <a:t>Workspace</a:t>
+            </a:r>
+          </a:p>
+          <a:p>
+            <a:pPr algn="ctr"/>
+            <a:r>
+              <a:rPr lang="en-IE" b="1" i="1" dirty="0"/>
+              <a:t>Manager</a:t>
+            </a:r>
+            <a:endParaRPr lang="pl-PL" b="1" i="1" dirty="0"/>
+          </a:p>
+        </p:txBody>
+      </p:sp>
+      <p:cxnSp>
+        <p:nvCxnSpPr>
+          <p:cNvPr id="34" name="Straight Arrow Connector 33">
+            <a:extLst>
+              <a:ext uri="{FF2B5EF4-FFF2-40B4-BE49-F238E27FC236}">
+                <a16:creationId xmlns:a16="http://schemas.microsoft.com/office/drawing/2014/main" id="{4D3E5215-EBA7-15A3-012D-861BA3C51F85}"/>
+              </a:ext>
+            </a:extLst>
+          </p:cNvPr>
+          <p:cNvCxnSpPr>
+            <a:cxnSpLocks/>
+            <a:stCxn id="32" idx="3"/>
+            <a:endCxn id="18" idx="1"/>
+          </p:cNvCxnSpPr>
+          <p:nvPr/>
+        </p:nvCxnSpPr>
+        <p:spPr>
+          <a:xfrm flipV="1">
+            <a:off x="1353439" y="3516926"/>
+            <a:ext cx="778712" cy="857477"/>
+          </a:xfrm>
+          <a:prstGeom prst="straightConnector1">
+            <a:avLst/>
+          </a:prstGeom>
+          <a:ln>
+            <a:tailEnd type="triangle"/>
+          </a:ln>
+        </p:spPr>
+        <p:style>
+          <a:lnRef idx="3">
+            <a:schemeClr val="accent6"/>
+          </a:lnRef>
+          <a:fillRef idx="0">
+            <a:schemeClr val="accent6"/>
+          </a:fillRef>
+          <a:effectRef idx="2">
+            <a:schemeClr val="accent6"/>
+          </a:effectRef>
+          <a:fontRef idx="minor">
+            <a:schemeClr val="tx1"/>
+          </a:fontRef>
+        </p:style>
+      </p:cxnSp>
+      <p:sp>
+        <p:nvSpPr>
+          <p:cNvPr id="35" name="TextBox 34">
+            <a:extLst>
+              <a:ext uri="{FF2B5EF4-FFF2-40B4-BE49-F238E27FC236}">
+                <a16:creationId xmlns:a16="http://schemas.microsoft.com/office/drawing/2014/main" id="{316B09CE-ED15-F81B-92C3-3075B3C74EBA}"/>
+              </a:ext>
+            </a:extLst>
+          </p:cNvPr>
+          <p:cNvSpPr txBox="1"/>
+          <p:nvPr/>
+        </p:nvSpPr>
+        <p:spPr>
+          <a:xfrm>
+            <a:off x="2551240" y="4216840"/>
+            <a:ext cx="1028230" cy="338554"/>
+          </a:xfrm>
+          <a:prstGeom prst="rect">
+            <a:avLst/>
+          </a:prstGeom>
+          <a:noFill/>
+        </p:spPr>
+        <p:txBody>
+          <a:bodyPr wrap="none" rtlCol="0">
+            <a:spAutoFit/>
+          </a:bodyPr>
+          <a:lstStyle/>
+          <a:p>
+            <a:r>
+              <a:rPr lang="en-IE" sz="1600" dirty="0"/>
+              <a:t>Ban Users</a:t>
+            </a:r>
+            <a:endParaRPr lang="pl-PL" sz="1600" dirty="0"/>
+          </a:p>
+        </p:txBody>
+      </p:sp>
+      <p:cxnSp>
+        <p:nvCxnSpPr>
+          <p:cNvPr id="41" name="Straight Arrow Connector 40">
+            <a:extLst>
+              <a:ext uri="{FF2B5EF4-FFF2-40B4-BE49-F238E27FC236}">
+                <a16:creationId xmlns:a16="http://schemas.microsoft.com/office/drawing/2014/main" id="{EA223209-BF8A-2DB0-D54C-B09EA3CD2AAD}"/>
+              </a:ext>
+            </a:extLst>
+          </p:cNvPr>
+          <p:cNvCxnSpPr>
+            <a:stCxn id="32" idx="3"/>
+            <a:endCxn id="21" idx="1"/>
+          </p:cNvCxnSpPr>
+          <p:nvPr/>
+        </p:nvCxnSpPr>
+        <p:spPr>
+          <a:xfrm flipV="1">
+            <a:off x="1353439" y="4114167"/>
+            <a:ext cx="869076" cy="260236"/>
+          </a:xfrm>
+          <a:prstGeom prst="straightConnector1">
+            <a:avLst/>
+          </a:prstGeom>
+          <a:ln>
+            <a:tailEnd type="triangle"/>
+          </a:ln>
+        </p:spPr>
+        <p:style>
+          <a:lnRef idx="3">
+            <a:schemeClr val="accent6"/>
+          </a:lnRef>
+          <a:fillRef idx="0">
+            <a:schemeClr val="accent6"/>
+          </a:fillRef>
+          <a:effectRef idx="2">
+            <a:schemeClr val="accent6"/>
+          </a:effectRef>
+          <a:fontRef idx="minor">
+            <a:schemeClr val="tx1"/>
+          </a:fontRef>
+        </p:style>
+      </p:cxnSp>
+      <p:cxnSp>
+        <p:nvCxnSpPr>
+          <p:cNvPr id="43" name="Straight Arrow Connector 42">
+            <a:extLst>
+              <a:ext uri="{FF2B5EF4-FFF2-40B4-BE49-F238E27FC236}">
+                <a16:creationId xmlns:a16="http://schemas.microsoft.com/office/drawing/2014/main" id="{8D4039CE-B76A-9077-6490-957F50721052}"/>
+              </a:ext>
+            </a:extLst>
+          </p:cNvPr>
+          <p:cNvCxnSpPr>
+            <a:stCxn id="32" idx="3"/>
+            <a:endCxn id="35" idx="1"/>
+          </p:cNvCxnSpPr>
+          <p:nvPr/>
+        </p:nvCxnSpPr>
+        <p:spPr>
+          <a:xfrm>
+            <a:off x="1353439" y="4374403"/>
+            <a:ext cx="1197801" cy="11714"/>
+          </a:xfrm>
+          <a:prstGeom prst="straightConnector1">
+            <a:avLst/>
+          </a:prstGeom>
+          <a:ln>
+            <a:tailEnd type="triangle"/>
+          </a:ln>
+        </p:spPr>
+        <p:style>
+          <a:lnRef idx="3">
+            <a:schemeClr val="accent6"/>
+          </a:lnRef>
+          <a:fillRef idx="0">
+            <a:schemeClr val="accent6"/>
+          </a:fillRef>
+          <a:effectRef idx="2">
+            <a:schemeClr val="accent6"/>
+          </a:effectRef>
+          <a:fontRef idx="minor">
+            <a:schemeClr val="tx1"/>
+          </a:fontRef>
+        </p:style>
+      </p:cxnSp>
+      <p:cxnSp>
+        <p:nvCxnSpPr>
+          <p:cNvPr id="69" name="Straight Arrow Connector 68">
+            <a:extLst>
+              <a:ext uri="{FF2B5EF4-FFF2-40B4-BE49-F238E27FC236}">
+                <a16:creationId xmlns:a16="http://schemas.microsoft.com/office/drawing/2014/main" id="{41B4DE46-B178-297A-FDDB-F451C721C9A9}"/>
+              </a:ext>
+            </a:extLst>
+          </p:cNvPr>
+          <p:cNvCxnSpPr>
+            <a:stCxn id="32" idx="0"/>
+            <a:endCxn id="63" idx="2"/>
+          </p:cNvCxnSpPr>
+          <p:nvPr/>
+        </p:nvCxnSpPr>
+        <p:spPr>
+          <a:xfrm flipH="1" flipV="1">
+            <a:off x="722770" y="3284127"/>
+            <a:ext cx="4152" cy="767110"/>
+          </a:xfrm>
+          <a:prstGeom prst="straightConnector1">
+            <a:avLst/>
+          </a:prstGeom>
+          <a:ln>
+            <a:tailEnd type="triangle"/>
+          </a:ln>
+        </p:spPr>
+        <p:style>
+          <a:lnRef idx="1">
+            <a:schemeClr val="accent1"/>
+          </a:lnRef>
+          <a:fillRef idx="0">
+            <a:schemeClr val="accent1"/>
+          </a:fillRef>
+          <a:effectRef idx="0">
+            <a:schemeClr val="accent1"/>
+          </a:effectRef>
+          <a:fontRef idx="minor">
+            <a:schemeClr val="tx1"/>
+          </a:fontRef>
+        </p:style>
+      </p:cxnSp>
+      <p:sp>
+        <p:nvSpPr>
+          <p:cNvPr id="70" name="TextBox 69">
+            <a:extLst>
+              <a:ext uri="{FF2B5EF4-FFF2-40B4-BE49-F238E27FC236}">
+                <a16:creationId xmlns:a16="http://schemas.microsoft.com/office/drawing/2014/main" id="{FC8EE690-75B8-8A4B-A1FD-99D49CA54F07}"/>
+              </a:ext>
+            </a:extLst>
+          </p:cNvPr>
+          <p:cNvSpPr txBox="1"/>
+          <p:nvPr/>
+        </p:nvSpPr>
+        <p:spPr>
+          <a:xfrm>
+            <a:off x="3498547" y="5024210"/>
+            <a:ext cx="2770182" cy="369332"/>
+          </a:xfrm>
+          <a:prstGeom prst="rect">
+            <a:avLst/>
+          </a:prstGeom>
+          <a:noFill/>
+        </p:spPr>
+        <p:txBody>
+          <a:bodyPr wrap="none" rtlCol="0">
+            <a:spAutoFit/>
+          </a:bodyPr>
+          <a:lstStyle/>
+          <a:p>
+            <a:r>
+              <a:rPr lang="en-IE" i="1" dirty="0">
+                <a:solidFill>
+                  <a:schemeClr val="accent5">
+                    <a:lumMod val="60000"/>
+                    <a:lumOff val="40000"/>
+                  </a:schemeClr>
+                </a:solidFill>
+              </a:rPr>
+              <a:t>Optional Features in Yellow</a:t>
+            </a:r>
+            <a:endParaRPr lang="pl-PL" i="1" dirty="0">
+              <a:solidFill>
+                <a:schemeClr val="accent5">
+                  <a:lumMod val="60000"/>
+                  <a:lumOff val="40000"/>
+                </a:schemeClr>
+              </a:solidFill>
+            </a:endParaRPr>
+          </a:p>
+        </p:txBody>
+      </p:sp>
     </p:spTree>
     <p:extLst>
       <p:ext uri="{BB962C8B-B14F-4D97-AF65-F5344CB8AC3E}">

</xml_diff>

<commit_message>
Slightly changed slide's titles to comply with requirement
</commit_message>
<xml_diff>
--- a/ThingSpaceTsM2.pptx
+++ b/ThingSpaceTsM2.pptx
@@ -5972,7 +5972,7 @@
             <a:pPr algn="ctr"/>
             <a:r>
               <a:rPr lang="en-IE" dirty="0"/>
-              <a:t>Overview and Target Audience</a:t>
+              <a:t>High-level Idea</a:t>
             </a:r>
             <a:endParaRPr lang="pl-PL" dirty="0"/>
           </a:p>
@@ -6330,8 +6330,8 @@
           <a:p>
             <a:pPr algn="ctr"/>
             <a:r>
-              <a:rPr lang="en-IE" dirty="0"/>
-              <a:t>Main Actors + central Features</a:t>
+              <a:rPr lang="en-US" dirty="0"/>
+              <a:t>Actors and Features</a:t>
             </a:r>
             <a:endParaRPr lang="pl-PL" dirty="0"/>
           </a:p>
@@ -9960,8 +9960,8 @@
         </p:nvSpPr>
         <p:spPr>
           <a:xfrm>
-            <a:off x="7634701" y="1612985"/>
-            <a:ext cx="1465466" cy="830997"/>
+            <a:off x="7634797" y="1612985"/>
+            <a:ext cx="1465273" cy="830997"/>
           </a:xfrm>
           <a:prstGeom prst="rect">
             <a:avLst/>
@@ -9991,7 +9991,7 @@
             </a:br>
             <a:r>
               <a:rPr lang="en-IE" sz="1600" dirty="0"/>
-              <a:t>Speech-to-text</a:t>
+              <a:t>Text-to-speech</a:t>
             </a:r>
             <a:endParaRPr lang="pl-PL" sz="1600" dirty="0"/>
           </a:p>
@@ -10093,7 +10093,7 @@
             <a:pPr algn="ctr"/>
             <a:r>
               <a:rPr lang="en-IE" dirty="0"/>
-              <a:t>High-level design diagram</a:t>
+              <a:t>High-level Design</a:t>
             </a:r>
             <a:endParaRPr lang="pl-PL" dirty="0"/>
           </a:p>

</xml_diff>